<commit_message>
update report,code and ppt. 17:46
</commit_message>
<xml_diff>
--- a/BDA_Final.pptx
+++ b/BDA_Final.pptx
@@ -10696,7 +10696,7 @@
                 </a:solidFill>
                 <a:latin typeface="Consolas" panose="020B0609020204030204" pitchFamily="49" charset="0"/>
               </a:rPr>
-              <a:t>4                  RBF        0.819444  </a:t>
+              <a:t>4              SVM-RBF        0.819444  </a:t>
             </a:r>
             <a:endParaRPr lang="en-GB" altLang="zh-TW" dirty="0">
               <a:solidFill>
@@ -10713,7 +10713,7 @@
                 </a:solidFill>
                 <a:latin typeface="Consolas" panose="020B0609020204030204" pitchFamily="49" charset="0"/>
               </a:rPr>
-              <a:t>5               Linear        0.777778  </a:t>
+              <a:t>5           SVM-Linear        0.777778  </a:t>
             </a:r>
             <a:endParaRPr lang="en-GB" altLang="zh-TW" dirty="0">
               <a:solidFill>
@@ -10730,7 +10730,7 @@
                 </a:solidFill>
                 <a:latin typeface="Consolas" panose="020B0609020204030204" pitchFamily="49" charset="0"/>
               </a:rPr>
-              <a:t>6           Polynomial        0.388889  </a:t>
+              <a:t>6       SVM-Polynomial        0.388889  </a:t>
             </a:r>
             <a:endParaRPr lang="en-GB" altLang="zh-TW" dirty="0">
               <a:solidFill>
@@ -10741,13 +10741,22 @@
           </a:p>
           <a:p>
             <a:r>
+              <a:rPr lang="en-GB" altLang="zh-TW">
+                <a:solidFill>
+                  <a:srgbClr val="000000"/>
+                </a:solidFill>
+                <a:latin typeface="Consolas" panose="020B0609020204030204" pitchFamily="49" charset="0"/>
+              </a:rPr>
+              <a:t>7          SVM-Sigmoid        </a:t>
+            </a:r>
+            <a:r>
               <a:rPr lang="en-GB" altLang="zh-TW" dirty="0">
                 <a:solidFill>
                   <a:srgbClr val="000000"/>
                 </a:solidFill>
                 <a:latin typeface="Consolas" panose="020B0609020204030204" pitchFamily="49" charset="0"/>
               </a:rPr>
-              <a:t>7              Sigmoid        0.770833  </a:t>
+              <a:t>0.770833  </a:t>
             </a:r>
             <a:endParaRPr lang="en-GB" altLang="zh-TW" b="0" i="0" dirty="0">
               <a:solidFill>

</xml_diff>